<commit_message>
June 17th git challenge
</commit_message>
<xml_diff>
--- a/unit1_projects/images/header.pptx
+++ b/unit1_projects/images/header.pptx
@@ -288,7 +288,7 @@
           <a:p>
             <a:fld id="{F19F3BC2-3695-8A49-8628-6B55CB2ABBC8}" type="datetimeFigureOut">
               <a:rPr lang="en-US" smtClean="0"/>
-              <a:t>6/7/14</a:t>
+              <a:t>6/14/14</a:t>
             </a:fld>
             <a:endParaRPr lang="en-US"/>
           </a:p>
@@ -458,7 +458,7 @@
           <a:p>
             <a:fld id="{F19F3BC2-3695-8A49-8628-6B55CB2ABBC8}" type="datetimeFigureOut">
               <a:rPr lang="en-US" smtClean="0"/>
-              <a:t>6/7/14</a:t>
+              <a:t>6/14/14</a:t>
             </a:fld>
             <a:endParaRPr lang="en-US"/>
           </a:p>
@@ -638,7 +638,7 @@
           <a:p>
             <a:fld id="{F19F3BC2-3695-8A49-8628-6B55CB2ABBC8}" type="datetimeFigureOut">
               <a:rPr lang="en-US" smtClean="0"/>
-              <a:t>6/7/14</a:t>
+              <a:t>6/14/14</a:t>
             </a:fld>
             <a:endParaRPr lang="en-US"/>
           </a:p>
@@ -808,7 +808,7 @@
           <a:p>
             <a:fld id="{F19F3BC2-3695-8A49-8628-6B55CB2ABBC8}" type="datetimeFigureOut">
               <a:rPr lang="en-US" smtClean="0"/>
-              <a:t>6/7/14</a:t>
+              <a:t>6/14/14</a:t>
             </a:fld>
             <a:endParaRPr lang="en-US"/>
           </a:p>
@@ -1054,7 +1054,7 @@
           <a:p>
             <a:fld id="{F19F3BC2-3695-8A49-8628-6B55CB2ABBC8}" type="datetimeFigureOut">
               <a:rPr lang="en-US" smtClean="0"/>
-              <a:t>6/7/14</a:t>
+              <a:t>6/14/14</a:t>
             </a:fld>
             <a:endParaRPr lang="en-US"/>
           </a:p>
@@ -1342,7 +1342,7 @@
           <a:p>
             <a:fld id="{F19F3BC2-3695-8A49-8628-6B55CB2ABBC8}" type="datetimeFigureOut">
               <a:rPr lang="en-US" smtClean="0"/>
-              <a:t>6/7/14</a:t>
+              <a:t>6/14/14</a:t>
             </a:fld>
             <a:endParaRPr lang="en-US"/>
           </a:p>
@@ -1769,7 +1769,7 @@
           <a:p>
             <a:fld id="{F19F3BC2-3695-8A49-8628-6B55CB2ABBC8}" type="datetimeFigureOut">
               <a:rPr lang="en-US" smtClean="0"/>
-              <a:t>6/7/14</a:t>
+              <a:t>6/14/14</a:t>
             </a:fld>
             <a:endParaRPr lang="en-US"/>
           </a:p>
@@ -1887,7 +1887,7 @@
           <a:p>
             <a:fld id="{F19F3BC2-3695-8A49-8628-6B55CB2ABBC8}" type="datetimeFigureOut">
               <a:rPr lang="en-US" smtClean="0"/>
-              <a:t>6/7/14</a:t>
+              <a:t>6/14/14</a:t>
             </a:fld>
             <a:endParaRPr lang="en-US"/>
           </a:p>
@@ -1982,7 +1982,7 @@
           <a:p>
             <a:fld id="{F19F3BC2-3695-8A49-8628-6B55CB2ABBC8}" type="datetimeFigureOut">
               <a:rPr lang="en-US" smtClean="0"/>
-              <a:t>6/7/14</a:t>
+              <a:t>6/14/14</a:t>
             </a:fld>
             <a:endParaRPr lang="en-US"/>
           </a:p>
@@ -2259,7 +2259,7 @@
           <a:p>
             <a:fld id="{F19F3BC2-3695-8A49-8628-6B55CB2ABBC8}" type="datetimeFigureOut">
               <a:rPr lang="en-US" smtClean="0"/>
-              <a:t>6/7/14</a:t>
+              <a:t>6/14/14</a:t>
             </a:fld>
             <a:endParaRPr lang="en-US"/>
           </a:p>
@@ -2512,7 +2512,7 @@
           <a:p>
             <a:fld id="{F19F3BC2-3695-8A49-8628-6B55CB2ABBC8}" type="datetimeFigureOut">
               <a:rPr lang="en-US" smtClean="0"/>
-              <a:t>6/7/14</a:t>
+              <a:t>6/14/14</a:t>
             </a:fld>
             <a:endParaRPr lang="en-US"/>
           </a:p>
@@ -2725,7 +2725,7 @@
           <a:p>
             <a:fld id="{F19F3BC2-3695-8A49-8628-6B55CB2ABBC8}" type="datetimeFigureOut">
               <a:rPr lang="en-US" smtClean="0"/>
-              <a:t>6/7/14</a:t>
+              <a:t>6/14/14</a:t>
             </a:fld>
             <a:endParaRPr lang="en-US"/>
           </a:p>
@@ -3100,44 +3100,66 @@
           <a:chExt cx="0" cy="0"/>
         </a:xfrm>
       </p:grpSpPr>
-      <p:sp>
-        <p:nvSpPr>
-          <p:cNvPr id="3" name="Subtitle 2"/>
-          <p:cNvSpPr>
-            <a:spLocks noGrp="1"/>
-          </p:cNvSpPr>
-          <p:nvPr>
-            <p:ph type="subTitle" idx="1"/>
-          </p:nvPr>
-        </p:nvSpPr>
+      <p:pic>
+        <p:nvPicPr>
+          <p:cNvPr id="4" name="Picture 3" descr="Screenshot 2014-06-14 19.39.49.png"/>
+          <p:cNvPicPr>
+            <a:picLocks noChangeAspect="1"/>
+          </p:cNvPicPr>
+          <p:nvPr/>
+        </p:nvPicPr>
+        <p:blipFill>
+          <a:blip r:embed="rId2">
+            <a:extLst>
+              <a:ext uri="{28A0092B-C50C-407E-A947-70E740481C1C}">
+                <a14:useLocalDpi xmlns:a14="http://schemas.microsoft.com/office/drawing/2010/main" val="0"/>
+              </a:ext>
+            </a:extLst>
+          </a:blip>
+          <a:stretch>
+            <a:fillRect/>
+          </a:stretch>
+        </p:blipFill>
         <p:spPr>
           <a:xfrm>
-            <a:off x="192112" y="149508"/>
-            <a:ext cx="8751772" cy="602332"/>
+            <a:off x="4887166" y="126723"/>
+            <a:ext cx="5283200" cy="660400"/>
           </a:xfrm>
+          <a:prstGeom prst="rect">
+            <a:avLst/>
+          </a:prstGeom>
         </p:spPr>
-        <p:txBody>
-          <a:bodyPr>
-            <a:normAutofit/>
-          </a:bodyPr>
-          <a:lstStyle/>
-          <a:p>
-            <a:r>
-              <a:rPr lang="en-US" dirty="0" smtClean="0">
-                <a:solidFill>
-                  <a:srgbClr val="E40202"/>
-                </a:solidFill>
-              </a:rPr>
-              <a:t>&gt;&gt;&gt;&gt;&gt;&gt;&gt;&gt;&gt;&gt;&gt;&gt;&gt;&gt;&gt;&gt;&gt;&gt;&gt;&gt;&gt;&lt;&lt;&lt;&lt;&lt;&lt;&lt;&lt;&lt;&lt;&lt;&lt;&lt;&lt;&lt;&lt;&lt;&lt;&lt;&lt;&lt;</a:t>
-            </a:r>
-            <a:endParaRPr lang="en-US" dirty="0">
-              <a:solidFill>
-                <a:srgbClr val="E40202"/>
-              </a:solidFill>
-            </a:endParaRPr>
-          </a:p>
-        </p:txBody>
-      </p:sp>
+      </p:pic>
+      <p:pic>
+        <p:nvPicPr>
+          <p:cNvPr id="5" name="Picture 4" descr="Screenshot 2014-06-14 19.39.49.png"/>
+          <p:cNvPicPr>
+            <a:picLocks noChangeAspect="1"/>
+          </p:cNvPicPr>
+          <p:nvPr/>
+        </p:nvPicPr>
+        <p:blipFill>
+          <a:blip r:embed="rId2">
+            <a:extLst>
+              <a:ext uri="{28A0092B-C50C-407E-A947-70E740481C1C}">
+                <a14:useLocalDpi xmlns:a14="http://schemas.microsoft.com/office/drawing/2010/main" val="0"/>
+              </a:ext>
+            </a:extLst>
+          </a:blip>
+          <a:stretch>
+            <a:fillRect/>
+          </a:stretch>
+        </p:blipFill>
+        <p:spPr>
+          <a:xfrm>
+            <a:off x="0" y="126723"/>
+            <a:ext cx="5283200" cy="660400"/>
+          </a:xfrm>
+          <a:prstGeom prst="rect">
+            <a:avLst/>
+          </a:prstGeom>
+        </p:spPr>
+      </p:pic>
     </p:spTree>
     <p:extLst>
       <p:ext uri="{BB962C8B-B14F-4D97-AF65-F5344CB8AC3E}">

</xml_diff>